<commit_message>
Bổ xung bài tập 1, 2
</commit_message>
<xml_diff>
--- a/Bai 20 Phat hien trung lap gan.pptx
+++ b/Bai 20 Phat hien trung lap gan.pptx
@@ -162,7 +162,7 @@
   </p:defaultTextStyle>
   <p:extLst>
     <p:ext uri="{EFAFB233-063F-42B5-8137-9DF3F51BA10A}">
-      <p15:sldGuideLst xmlns="" xmlns:p15="http://schemas.microsoft.com/office/powerpoint/2012/main">
+      <p15:sldGuideLst xmlns:p15="http://schemas.microsoft.com/office/powerpoint/2012/main">
         <p15:guide id="1" orient="horz" pos="2160">
           <p15:clr>
             <a:srgbClr val="A4A3A4"/>
@@ -176,7 +176,7 @@
       </p15:sldGuideLst>
     </p:ext>
     <p:ext uri="{2D200454-40CA-4A62-9FC3-DE9A4176ACB9}">
-      <p15:notesGuideLst xmlns="" xmlns:p15="http://schemas.microsoft.com/office/powerpoint/2012/main">
+      <p15:notesGuideLst xmlns:p15="http://schemas.microsoft.com/office/powerpoint/2012/main">
         <p15:guide id="1" orient="horz" pos="2880">
           <p15:clr>
             <a:srgbClr val="A4A3A4"/>
@@ -4918,19 +4918,7 @@
           <a:p>
             <a:r>
               <a:rPr lang="en-US" sz="2400" smtClean="0"/>
-              <a:t>Chương </a:t>
-            </a:r>
-            <a:r>
-              <a:rPr lang="en-US" sz="2400" smtClean="0"/>
-              <a:t>20</a:t>
-            </a:r>
-            <a:r>
-              <a:rPr lang="en-US" sz="2400" smtClean="0"/>
-              <a:t>. </a:t>
-            </a:r>
-            <a:r>
-              <a:rPr lang="en-US" sz="2400" smtClean="0"/>
-              <a:t>Phát </a:t>
+              <a:t>Chương 20. Phát </a:t>
             </a:r>
             <a:r>
               <a:rPr lang="en-US" sz="2400" dirty="0" err="1" smtClean="0"/>
@@ -5815,11 +5803,7 @@
             </a:r>
             <a:r>
               <a:rPr lang="en-US" smtClean="0"/>
-              <a:t> </a:t>
-            </a:r>
-            <a:r>
-              <a:rPr lang="en-US" smtClean="0"/>
-              <a:t>bộ 2-từ?</a:t>
+              <a:t> bộ 2-từ?</a:t>
             </a:r>
             <a:endParaRPr lang="de-DE" dirty="0"/>
           </a:p>
@@ -6182,11 +6166,7 @@
             </a:r>
             <a:r>
               <a:rPr lang="en-US" smtClean="0"/>
-              <a:t> </a:t>
-            </a:r>
-            <a:r>
-              <a:rPr lang="en-US" smtClean="0"/>
-              <a:t>2-từ?</a:t>
+              <a:t> 2-từ?</a:t>
             </a:r>
             <a:endParaRPr lang="de-DE" dirty="0"/>
           </a:p>
@@ -6200,8 +6180,8 @@
         </p:nvSpPr>
         <p:spPr>
           <a:xfrm>
-            <a:off x="195893" y="5373216"/>
-            <a:ext cx="8352928" cy="1040285"/>
+            <a:off x="195892" y="5373216"/>
+            <a:ext cx="8552571" cy="1040285"/>
           </a:xfrm>
           <a:prstGeom prst="rect">
             <a:avLst/>
@@ -6312,7 +6292,47 @@
                   <a:schemeClr val="tx2"/>
                 </a:solidFill>
               </a:rPr>
-              <a:t>số Jaccard rất nhạy cảm với trật tự </a:t>
+              <a:t>số Jaccard </a:t>
+            </a:r>
+            <a:r>
+              <a:rPr lang="de-DE" sz="2800" dirty="0" smtClean="0">
+                <a:solidFill>
+                  <a:schemeClr val="tx2"/>
+                </a:solidFill>
+              </a:rPr>
+              <a:t>trên tập shingle </a:t>
+            </a:r>
+            <a:r>
+              <a:rPr lang="de-DE" sz="2800" dirty="0" smtClean="0">
+                <a:solidFill>
+                  <a:schemeClr val="tx2"/>
+                </a:solidFill>
+              </a:rPr>
+              <a:t>rất </a:t>
+            </a:r>
+            <a:r>
+              <a:rPr lang="de-DE" sz="2800" dirty="0">
+                <a:solidFill>
+                  <a:schemeClr val="tx2"/>
+                </a:solidFill>
+              </a:rPr>
+              <a:t>nhạy </a:t>
+            </a:r>
+            <a:r>
+              <a:rPr lang="de-DE" sz="2800" dirty="0" smtClean="0">
+                <a:solidFill>
+                  <a:schemeClr val="tx2"/>
+                </a:solidFill>
+              </a:rPr>
+              <a:t>với </a:t>
+            </a:r>
+            <a:r>
+              <a:rPr lang="de-DE" sz="2800" dirty="0">
+                <a:solidFill>
+                  <a:schemeClr val="tx2"/>
+                </a:solidFill>
+              </a:rPr>
+              <a:t>trật tự </a:t>
             </a:r>
             <a:r>
               <a:rPr lang="de-DE" sz="2800" dirty="0" smtClean="0">
@@ -6673,11 +6693,7 @@
             </a:r>
             <a:r>
               <a:rPr lang="en-US" smtClean="0"/>
-              <a:t>) </a:t>
-            </a:r>
-            <a:r>
-              <a:rPr lang="en-US" smtClean="0"/>
-              <a:t>là biểu diễn giản lược của mô hình tập shingles.</a:t>
+              <a:t>) là biểu diễn giản lược của mô hình tập shingles.</a:t>
             </a:r>
             <a:endParaRPr lang="en-US" dirty="0" smtClean="0"/>
           </a:p>
@@ -6708,11 +6724,7 @@
             </a:r>
             <a:r>
               <a:rPr lang="en-US"/>
-              <a:t> là tổng đại diện </a:t>
-            </a:r>
-            <a:r>
-              <a:rPr lang="en-US"/>
-              <a:t>của </a:t>
+              <a:t> là tổng đại diện của </a:t>
             </a:r>
             <a:r>
               <a:rPr lang="en-US" smtClean="0"/>
@@ -6750,7 +6762,6 @@
               <a:rPr lang="en-US" smtClean="0"/>
               <a:t>.</a:t>
             </a:r>
-            <a:endParaRPr lang="en-US" smtClean="0"/>
           </a:p>
           <a:p>
             <a:pPr lvl="1"/>
@@ -6820,11 +6831,7 @@
             </a:r>
             <a:r>
               <a:rPr lang="en-US" smtClean="0"/>
-              <a:t>trên tổng đại diện</a:t>
-            </a:r>
-            <a:r>
-              <a:rPr lang="en-US" smtClean="0"/>
-              <a:t>.</a:t>
+              <a:t>trên tổng đại diện.</a:t>
             </a:r>
             <a:endParaRPr lang="en-US" dirty="0" smtClean="0">
               <a:solidFill>
@@ -7807,11 +7814,7 @@
           <a:p>
             <a:r>
               <a:rPr lang="en-US" smtClean="0"/>
-              <a:t>Ước lượng h</a:t>
-            </a:r>
-            <a:r>
-              <a:rPr lang="en-US" smtClean="0"/>
-              <a:t>ệ </a:t>
+              <a:t>Ước lượng hệ </a:t>
             </a:r>
             <a:r>
               <a:rPr lang="en-US" err="1"/>
@@ -7829,8 +7832,8 @@
           </a:p>
         </p:txBody>
       </p:sp>
-      <mc:AlternateContent xmlns:mc="http://schemas.openxmlformats.org/markup-compatibility/2006">
-        <mc:Choice xmlns:a14="http://schemas.microsoft.com/office/drawing/2010/main" Requires="a14">
+      <mc:AlternateContent xmlns:mc="http://schemas.openxmlformats.org/markup-compatibility/2006" xmlns:a14="http://schemas.microsoft.com/office/drawing/2010/main">
+        <mc:Choice Requires="a14">
           <p:sp>
             <p:nvSpPr>
               <p:cNvPr id="744451" name="Rectangle 3"/>
@@ -7858,11 +7861,7 @@
                 </a:pPr>
                 <a:r>
                   <a:rPr lang="en-US" sz="2400" dirty="0" smtClean="0"/>
-                  <a:t>Đặt</a:t>
-                </a:r>
-                <a:r>
-                  <a:rPr lang="en-US" sz="2400" dirty="0" smtClean="0"/>
-                  <a:t> </a:t>
+                  <a:t>Đặt </a:t>
                 </a:r>
                 <a:r>
                   <a:rPr lang="en-US" sz="2400"/>
@@ -7909,11 +7908,7 @@
                 </a:r>
                 <a:r>
                   <a:rPr lang="en-US" sz="2400" smtClean="0"/>
-                  <a:t>; </a:t>
-                </a:r>
-                <a:r>
-                  <a:rPr lang="en-US" sz="2400" smtClean="0"/>
-                  <a:t>I = d</a:t>
+                  <a:t>; I = d</a:t>
                 </a:r>
                 <a:r>
                   <a:rPr lang="en-US" sz="2400" baseline="-25000" smtClean="0"/>
@@ -8476,7 +8471,7 @@
             </p:txBody>
           </p:sp>
         </mc:Choice>
-        <mc:Fallback>
+        <mc:Fallback xmlns="">
           <p:sp>
             <p:nvSpPr>
               <p:cNvPr id="744451" name="Rectangle 3"/>
@@ -8573,6 +8568,13 @@
   <p:clrMapOvr>
     <a:masterClrMapping/>
   </p:clrMapOvr>
+  <p:timing>
+    <p:tnLst>
+      <p:par>
+        <p:cTn id="1" dur="indefinite" restart="never" nodeType="tmRoot"/>
+      </p:par>
+    </p:tnLst>
+  </p:timing>
 </p:sld>
 </file>
 
@@ -8846,15 +8848,7 @@
             </a:pPr>
             <a:r>
               <a:rPr lang="en-US" smtClean="0"/>
-              <a:t>Gọi phép </a:t>
-            </a:r>
-            <a:r>
-              <a:rPr lang="en-US" smtClean="0"/>
-              <a:t>tr</a:t>
-            </a:r>
-            <a:r>
-              <a:rPr lang="en-US" smtClean="0"/>
-              <a:t>ộn </a:t>
+              <a:t>Gọi phép trộn </a:t>
             </a:r>
             <a:r>
               <a:rPr lang="en-US" i="1" dirty="0"/>
@@ -9057,11 +9051,7 @@
             </a:r>
             <a:r>
               <a:rPr lang="pt-BR" smtClean="0"/>
-              <a:t>tr</a:t>
-            </a:r>
-            <a:r>
-              <a:rPr lang="pt-BR" smtClean="0"/>
-              <a:t>ộn</a:t>
+              <a:t>trộn</a:t>
             </a:r>
             <a:r>
               <a:rPr lang="pt-BR" dirty="0" smtClean="0"/>
@@ -9117,11 +9107,7 @@
             </a:r>
             <a:r>
               <a:rPr lang="en-US" smtClean="0"/>
-              <a:t> </a:t>
-            </a:r>
-            <a:r>
-              <a:rPr lang="en-US" smtClean="0"/>
-              <a:t>trộn </a:t>
+              <a:t> trộn </a:t>
             </a:r>
             <a:r>
               <a:rPr lang="en-US" dirty="0" err="1" smtClean="0"/>
@@ -9204,6 +9190,13 @@
   <p:clrMapOvr>
     <a:masterClrMapping/>
   </p:clrMapOvr>
+  <p:timing>
+    <p:tnLst>
+      <p:par>
+        <p:cTn id="1" dur="indefinite" restart="never" nodeType="tmRoot"/>
+      </p:par>
+    </p:tnLst>
+  </p:timing>
 </p:sld>
 </file>
 
@@ -9365,11 +9358,7 @@
             </a:r>
             <a:r>
               <a:rPr lang="en-US" smtClean="0"/>
-              <a:t> </a:t>
-            </a:r>
-            <a:r>
-              <a:rPr lang="en-US" smtClean="0"/>
-              <a:t>trộn</a:t>
+              <a:t> trộn</a:t>
             </a:r>
             <a:r>
               <a:rPr lang="en-US" dirty="0"/>
@@ -9429,11 +9418,7 @@
             </a:r>
             <a:r>
               <a:rPr lang="de-DE" smtClean="0"/>
-              <a:t>cực </a:t>
-            </a:r>
-            <a:r>
-              <a:rPr lang="de-DE" smtClean="0"/>
-              <a:t>tiểu</a:t>
+              <a:t>cực tiểu</a:t>
             </a:r>
           </a:p>
           <a:p>
@@ -9533,11 +9518,7 @@
             </a:r>
             <a:r>
               <a:rPr lang="de-DE" smtClean="0"/>
-              <a:t>là </a:t>
-            </a:r>
-            <a:r>
-              <a:rPr lang="de-DE" smtClean="0"/>
-              <a:t>k/K.</a:t>
+              <a:t>là k/K.</a:t>
             </a:r>
             <a:endParaRPr lang="de-DE" dirty="0"/>
           </a:p>
@@ -9548,6 +9529,13 @@
   <p:clrMapOvr>
     <a:masterClrMapping/>
   </p:clrMapOvr>
+  <p:timing>
+    <p:tnLst>
+      <p:par>
+        <p:cTn id="1" dur="indefinite" restart="never" nodeType="tmRoot"/>
+      </p:par>
+    </p:tnLst>
+  </p:timing>
 </p:sld>
 </file>
 
@@ -10244,6 +10232,13 @@
   <p:clrMapOvr>
     <a:masterClrMapping/>
   </p:clrMapOvr>
+  <p:timing>
+    <p:tnLst>
+      <p:par>
+        <p:cTn id="1" dur="indefinite" restart="never" nodeType="tmRoot"/>
+      </p:par>
+    </p:tnLst>
+  </p:timing>
 </p:sld>
 </file>
 
@@ -10630,21 +10625,49 @@
                 <a:latin typeface="Calibri" panose="020F0502020204030204" pitchFamily="34" charset="0"/>
                 <a:ea typeface="ＭＳ Ｐゴシック" panose="020B0600070205080204" pitchFamily="34" charset="-128"/>
               </a:rPr>
-              <a:t>) = 5</a:t>
-            </a:r>
-            <a:r>
-              <a:rPr lang="de-DE" sz="2400" i="1" dirty="0">
+              <a:t>) = </a:t>
+            </a:r>
+            <a:r>
+              <a:rPr lang="de-DE" sz="2400" dirty="0" smtClean="0">
                 <a:latin typeface="Calibri" panose="020F0502020204030204" pitchFamily="34" charset="0"/>
                 <a:ea typeface="ＭＳ Ｐゴシック" panose="020B0600070205080204" pitchFamily="34" charset="-128"/>
               </a:rPr>
+              <a:t>(5</a:t>
+            </a:r>
+            <a:r>
+              <a:rPr lang="de-DE" sz="2400" i="1" dirty="0" smtClean="0">
+                <a:latin typeface="Calibri" panose="020F0502020204030204" pitchFamily="34" charset="0"/>
+                <a:ea typeface="ＭＳ Ｐゴシック" panose="020B0600070205080204" pitchFamily="34" charset="-128"/>
+              </a:rPr>
               <a:t>x</a:t>
+            </a:r>
+            <a:r>
+              <a:rPr lang="de-DE" sz="2400" dirty="0" smtClean="0">
+                <a:latin typeface="Calibri" panose="020F0502020204030204" pitchFamily="34" charset="0"/>
+                <a:ea typeface="ＭＳ Ｐゴシック" panose="020B0600070205080204" pitchFamily="34" charset="-128"/>
+              </a:rPr>
+              <a:t> </a:t>
             </a:r>
             <a:r>
               <a:rPr lang="de-DE" sz="2400" dirty="0">
                 <a:latin typeface="Calibri" panose="020F0502020204030204" pitchFamily="34" charset="0"/>
                 <a:ea typeface="ＭＳ Ｐゴシック" panose="020B0600070205080204" pitchFamily="34" charset="-128"/>
               </a:rPr>
-              <a:t> + 5 mod 4</a:t>
+              <a:t>+ </a:t>
+            </a:r>
+            <a:r>
+              <a:rPr lang="de-DE" sz="2400" dirty="0" smtClean="0">
+                <a:latin typeface="Calibri" panose="020F0502020204030204" pitchFamily="34" charset="0"/>
+                <a:ea typeface="ＭＳ Ｐゴシック" panose="020B0600070205080204" pitchFamily="34" charset="-128"/>
+              </a:rPr>
+              <a:t>5) </a:t>
+            </a:r>
+            <a:r>
+              <a:rPr lang="de-DE" sz="2400" dirty="0">
+                <a:latin typeface="Calibri" panose="020F0502020204030204" pitchFamily="34" charset="0"/>
+                <a:ea typeface="ＭＳ Ｐゴシック" panose="020B0600070205080204" pitchFamily="34" charset="-128"/>
+              </a:rPr>
+              <a:t>mod 4</a:t>
             </a:r>
           </a:p>
           <a:p>
@@ -10684,6 +10707,13 @@
   <p:clrMapOvr>
     <a:masterClrMapping/>
   </p:clrMapOvr>
+  <p:timing>
+    <p:tnLst>
+      <p:par>
+        <p:cTn id="1" dur="indefinite" restart="never" nodeType="tmRoot"/>
+      </p:par>
+    </p:tnLst>
+  </p:timing>
 </p:sld>
 </file>
 
@@ -11121,21 +11151,56 @@
                 <a:latin typeface="Calibri" panose="020F0502020204030204" pitchFamily="34" charset="0"/>
                 <a:ea typeface="ＭＳ Ｐゴシック" panose="020B0600070205080204" pitchFamily="34" charset="-128"/>
               </a:rPr>
-              <a:t>) = 5</a:t>
-            </a:r>
-            <a:r>
-              <a:rPr lang="de-DE" sz="2400" i="1" dirty="0">
+              <a:t>) </a:t>
+            </a:r>
+            <a:r>
+              <a:rPr lang="de-DE" sz="2400">
                 <a:latin typeface="Calibri" panose="020F0502020204030204" pitchFamily="34" charset="0"/>
                 <a:ea typeface="ＭＳ Ｐゴシック" panose="020B0600070205080204" pitchFamily="34" charset="-128"/>
               </a:rPr>
+              <a:t>= </a:t>
+            </a:r>
+            <a:r>
+              <a:rPr lang="de-DE" sz="2400" smtClean="0">
+                <a:latin typeface="Calibri" panose="020F0502020204030204" pitchFamily="34" charset="0"/>
+                <a:ea typeface="ＭＳ Ｐゴシック" panose="020B0600070205080204" pitchFamily="34" charset="-128"/>
+              </a:rPr>
+              <a:t>(5</a:t>
+            </a:r>
+            <a:r>
+              <a:rPr lang="de-DE" sz="2400" i="1" smtClean="0">
+                <a:latin typeface="Calibri" panose="020F0502020204030204" pitchFamily="34" charset="0"/>
+                <a:ea typeface="ＭＳ Ｐゴシック" panose="020B0600070205080204" pitchFamily="34" charset="-128"/>
+              </a:rPr>
               <a:t>x</a:t>
+            </a:r>
+            <a:r>
+              <a:rPr lang="de-DE" sz="2400" smtClean="0">
+                <a:latin typeface="Calibri" panose="020F0502020204030204" pitchFamily="34" charset="0"/>
+                <a:ea typeface="ＭＳ Ｐゴシック" panose="020B0600070205080204" pitchFamily="34" charset="-128"/>
+              </a:rPr>
+              <a:t> </a:t>
+            </a:r>
+            <a:r>
+              <a:rPr lang="de-DE" sz="2400">
+                <a:latin typeface="Calibri" panose="020F0502020204030204" pitchFamily="34" charset="0"/>
+                <a:ea typeface="ＭＳ Ｐゴシック" panose="020B0600070205080204" pitchFamily="34" charset="-128"/>
+              </a:rPr>
+              <a:t>+ </a:t>
+            </a:r>
+            <a:r>
+              <a:rPr lang="de-DE" sz="2400" smtClean="0">
+                <a:latin typeface="Calibri" panose="020F0502020204030204" pitchFamily="34" charset="0"/>
+                <a:ea typeface="ＭＳ Ｐゴシック" panose="020B0600070205080204" pitchFamily="34" charset="-128"/>
+              </a:rPr>
+              <a:t>5) </a:t>
             </a:r>
             <a:r>
               <a:rPr lang="de-DE" sz="2400" dirty="0">
                 <a:latin typeface="Calibri" panose="020F0502020204030204" pitchFamily="34" charset="0"/>
                 <a:ea typeface="ＭＳ Ｐゴシック" panose="020B0600070205080204" pitchFamily="34" charset="-128"/>
               </a:rPr>
-              <a:t> + 5 mod 4</a:t>
+              <a:t>mod 4</a:t>
             </a:r>
           </a:p>
           <a:p>
@@ -11565,6 +11630,13 @@
   <p:clrMapOvr>
     <a:masterClrMapping/>
   </p:clrMapOvr>
+  <p:timing>
+    <p:tnLst>
+      <p:par>
+        <p:cTn id="1" dur="indefinite" restart="never" nodeType="tmRoot"/>
+      </p:par>
+    </p:tnLst>
+  </p:timing>
 </p:sld>
 </file>
 
@@ -11642,11 +11714,7 @@
           <a:p>
             <a:r>
               <a:rPr lang="de-DE" smtClean="0"/>
-              <a:t>Đáp </a:t>
-            </a:r>
-            <a:r>
-              <a:rPr lang="de-DE" smtClean="0"/>
-              <a:t>án (2)</a:t>
+              <a:t>Đáp án (2)</a:t>
             </a:r>
             <a:endParaRPr lang="vi-VN" dirty="0"/>
           </a:p>
@@ -11805,8 +11873,8 @@
           </a:p>
         </p:txBody>
       </p:sp>
-      <mc:AlternateContent xmlns:mc="http://schemas.openxmlformats.org/markup-compatibility/2006">
-        <mc:Choice xmlns:a14="http://schemas.microsoft.com/office/drawing/2010/main" Requires="a14">
+      <mc:AlternateContent xmlns:mc="http://schemas.openxmlformats.org/markup-compatibility/2006" xmlns:a14="http://schemas.microsoft.com/office/drawing/2010/main">
+        <mc:Choice Requires="a14">
           <p:sp>
             <p:nvSpPr>
               <p:cNvPr id="755715" name="Rectangle 3"/>
@@ -11829,15 +11897,7 @@
               <a:p>
                 <a:r>
                   <a:rPr lang="de-DE" sz="2400" smtClean="0"/>
-                  <a:t>Đầu </a:t>
-                </a:r>
-                <a:r>
-                  <a:rPr lang="de-DE" sz="2400" smtClean="0"/>
-                  <a:t>vào</a:t>
-                </a:r>
-                <a:r>
-                  <a:rPr lang="de-DE" sz="2400" smtClean="0"/>
-                  <a:t>:</a:t>
+                  <a:t>Đầu vào:</a:t>
                 </a:r>
               </a:p>
               <a:p>
@@ -11902,11 +11962,7 @@
                 <a:pPr lvl="1"/>
                 <a:r>
                   <a:rPr lang="en-US" sz="2000" smtClean="0"/>
-                  <a:t>K</a:t>
-                </a:r>
-                <a:r>
-                  <a:rPr lang="en-US" sz="2000" smtClean="0"/>
-                  <a:t> phép </a:t>
+                  <a:t>K phép </a:t>
                 </a:r>
                 <a:r>
                   <a:rPr lang="en-US" sz="2000" dirty="0" err="1"/>
@@ -11930,11 +11986,7 @@
                 </a:r>
                 <a:r>
                   <a:rPr lang="en-US" sz="2000" smtClean="0"/>
-                  <a:t> </a:t>
-                </a:r>
-                <a:r>
-                  <a:rPr lang="en-US" sz="2000" smtClean="0"/>
-                  <a:t>(K hàm </a:t>
+                  <a:t> (K hàm </a:t>
                 </a:r>
                 <a:r>
                   <a:rPr lang="en-US" sz="2000" dirty="0" err="1"/>
@@ -11956,7 +12008,7 @@
                       <m:fPr>
                         <m:ctrlPr>
                           <a:rPr lang="en-US" sz="2400" b="0" i="1" smtClean="0">
-                            <a:latin typeface="Cambria Math"/>
+                            <a:latin typeface="Cambria Math" panose="02040503050406030204" pitchFamily="18" charset="0"/>
                           </a:rPr>
                         </m:ctrlPr>
                       </m:fPr>
@@ -11971,7 +12023,7 @@
                           <m:dPr>
                             <m:ctrlPr>
                               <a:rPr lang="en-US" sz="2400" b="0" i="1" smtClean="0">
-                                <a:latin typeface="Cambria Math"/>
+                                <a:latin typeface="Cambria Math" panose="02040503050406030204" pitchFamily="18" charset="0"/>
                               </a:rPr>
                             </m:ctrlPr>
                           </m:dPr>
@@ -12058,11 +12110,7 @@
                 </a:r>
                 <a:r>
                   <a:rPr lang="en-US" sz="2000" smtClean="0"/>
-                  <a:t> </a:t>
-                </a:r>
-                <a:r>
-                  <a:rPr lang="en-US" sz="2000" smtClean="0"/>
-                  <a:t>qua các </a:t>
+                  <a:t> qua các </a:t>
                 </a:r>
                 <a:r>
                   <a:rPr lang="en-US" sz="2000" dirty="0" err="1" smtClean="0"/>
@@ -12113,7 +12161,7 @@
             </p:txBody>
           </p:sp>
         </mc:Choice>
-        <mc:Fallback>
+        <mc:Fallback xmlns="">
           <p:sp>
             <p:nvSpPr>
               <p:cNvPr id="755715" name="Rectangle 3"/>
@@ -13073,11 +13121,7 @@
             </a:r>
             <a:r>
               <a:rPr lang="en-US" smtClean="0"/>
-              <a:t> </a:t>
-            </a:r>
-            <a:r>
-              <a:rPr lang="en-US" smtClean="0"/>
-              <a:t>nhận những </a:t>
+              <a:t> nhận những </a:t>
             </a:r>
             <a:r>
               <a:rPr lang="en-US" dirty="0" err="1" smtClean="0"/>
@@ -13101,11 +13145,7 @@
             </a:r>
             <a:r>
               <a:rPr lang="en-US" smtClean="0"/>
-              <a:t> </a:t>
-            </a:r>
-            <a:r>
-              <a:rPr lang="en-US" smtClean="0"/>
-              <a:t>lặp</a:t>
+              <a:t> lặp</a:t>
             </a:r>
             <a:endParaRPr lang="de-DE" dirty="0"/>
           </a:p>
@@ -13201,11 +13241,7 @@
             </a:r>
             <a:r>
               <a:rPr lang="en-US" smtClean="0"/>
-              <a:t> </a:t>
-            </a:r>
-            <a:r>
-              <a:rPr lang="en-US" smtClean="0"/>
-              <a:t>trong </a:t>
+              <a:t> trong </a:t>
             </a:r>
             <a:r>
               <a:rPr lang="en-US" dirty="0" err="1" smtClean="0"/>
@@ -13940,7 +13976,6 @@
               <a:rPr lang="en-US" dirty="0"/>
               <a:t>;</a:t>
             </a:r>
-            <a:endParaRPr lang="en-US" dirty="0"/>
           </a:p>
           <a:p>
             <a:r>
@@ -14928,8 +14963,8 @@
           </a:p>
         </p:txBody>
       </p:sp>
-      <mc:AlternateContent xmlns:mc="http://schemas.openxmlformats.org/markup-compatibility/2006">
-        <mc:Choice xmlns:a14="http://schemas.microsoft.com/office/drawing/2010/main" Requires="a14">
+      <mc:AlternateContent xmlns:mc="http://schemas.openxmlformats.org/markup-compatibility/2006" xmlns:a14="http://schemas.microsoft.com/office/drawing/2010/main">
+        <mc:Choice Requires="a14">
           <p:sp>
             <p:nvSpPr>
               <p:cNvPr id="738307" name="Rectangle 3"/>
@@ -15129,7 +15164,7 @@
                         <m:dPr>
                           <m:ctrlPr>
                             <a:rPr lang="en-US" b="0" i="1" smtClean="0">
-                              <a:latin typeface="Cambria Math"/>
+                              <a:latin typeface="Cambria Math" panose="02040503050406030204" pitchFamily="18" charset="0"/>
                               <a:ea typeface="Cambria Math" panose="02040503050406030204" pitchFamily="18" charset="0"/>
                             </a:rPr>
                           </m:ctrlPr>
@@ -15169,7 +15204,7 @@
                         <m:fPr>
                           <m:ctrlPr>
                             <a:rPr lang="en-US" b="0" i="1" smtClean="0">
-                              <a:latin typeface="Cambria Math"/>
+                              <a:latin typeface="Cambria Math" panose="02040503050406030204" pitchFamily="18" charset="0"/>
                               <a:ea typeface="Cambria Math" panose="02040503050406030204" pitchFamily="18" charset="0"/>
                             </a:rPr>
                           </m:ctrlPr>
@@ -15181,7 +15216,7 @@
                               <m:endChr m:val="|"/>
                               <m:ctrlPr>
                                 <a:rPr lang="en-US" b="0" i="1" smtClean="0">
-                                  <a:latin typeface="Cambria Math"/>
+                                  <a:latin typeface="Cambria Math" panose="02040503050406030204" pitchFamily="18" charset="0"/>
                                   <a:ea typeface="Cambria Math" panose="02040503050406030204" pitchFamily="18" charset="0"/>
                                 </a:rPr>
                               </m:ctrlPr>
@@ -15218,7 +15253,7 @@
                               <m:endChr m:val="|"/>
                               <m:ctrlPr>
                                 <a:rPr lang="en-US" b="0" i="1" smtClean="0">
-                                  <a:latin typeface="Cambria Math"/>
+                                  <a:latin typeface="Cambria Math" panose="02040503050406030204" pitchFamily="18" charset="0"/>
                                   <a:ea typeface="Cambria Math" panose="02040503050406030204" pitchFamily="18" charset="0"/>
                                 </a:rPr>
                               </m:ctrlPr>
@@ -15368,7 +15403,7 @@
             </p:txBody>
           </p:sp>
         </mc:Choice>
-        <mc:Fallback>
+        <mc:Fallback xmlns="">
           <p:sp>
             <p:nvSpPr>
               <p:cNvPr id="738307" name="Rectangle 3"/>
@@ -16032,7 +16067,7 @@
   </a:extraClrSchemeLst>
   <a:extLst>
     <a:ext uri="{05A4C25C-085E-4340-85A3-A5531E510DB2}">
-      <thm15:themeFamily xmlns="" xmlns:thm15="http://schemas.microsoft.com/office/thememl/2012/main" name="Office Theme" id="{62F939B6-93AF-4DB8-9C6B-D6C7DFDC589F}" vid="{4A3C46E8-61CC-4603-A589-7422A47A8E4A}"/>
+      <thm15:themeFamily xmlns:thm15="http://schemas.microsoft.com/office/thememl/2012/main" name="Office Theme" id="{62F939B6-93AF-4DB8-9C6B-D6C7DFDC589F}" vid="{4A3C46E8-61CC-4603-A589-7422A47A8E4A}"/>
     </a:ext>
   </a:extLst>
 </a:theme>
@@ -16293,7 +16328,7 @@
   <a:extraClrSchemeLst/>
   <a:extLst>
     <a:ext uri="{05A4C25C-085E-4340-85A3-A5531E510DB2}">
-      <thm15:themeFamily xmlns="" xmlns:thm15="http://schemas.microsoft.com/office/thememl/2012/main" name="Office Theme" id="{62F939B6-93AF-4DB8-9C6B-D6C7DFDC589F}" vid="{4A3C46E8-61CC-4603-A589-7422A47A8E4A}"/>
+      <thm15:themeFamily xmlns:thm15="http://schemas.microsoft.com/office/thememl/2012/main" name="Office Theme" id="{62F939B6-93AF-4DB8-9C6B-D6C7DFDC589F}" vid="{4A3C46E8-61CC-4603-A589-7422A47A8E4A}"/>
     </a:ext>
   </a:extLst>
 </a:theme>

</xml_diff>